<commit_message>
Placeholder for Chapter 3 slides
</commit_message>
<xml_diff>
--- a/lectures/KR-1.pptx
+++ b/lectures/KR-1.pptx
@@ -3363,6 +3363,14 @@
               <a:rPr lang="en-US" dirty="0"/>
               <a:t>K&amp;R Chapter 1</a:t>
             </a:r>
+            <a:br>
+              <a:rPr lang="en-US" dirty="0"/>
+            </a:br>
+            <a:r>
+              <a:rPr lang="en-US" sz="5400" dirty="0"/>
+              <a:t>A Tutorial Introduction</a:t>
+            </a:r>
+            <a:endParaRPr lang="en-US" dirty="0"/>
           </a:p>
         </p:txBody>
       </p:sp>
@@ -4778,7 +4786,7 @@
           <a:p>
             <a:r>
               <a:rPr lang="en-US" dirty="0"/>
-              <a:t>Looking ahead</a:t>
+              <a:t>Outline of the book</a:t>
             </a:r>
           </a:p>
         </p:txBody>
@@ -4820,7 +4828,7 @@
             <a:pPr lvl="1"/>
             <a:r>
               <a:rPr lang="en-US" dirty="0"/>
-              <a:t>Arrays, strings and the fact that strings are character arrays</a:t>
+              <a:t>Arrays, strings and the weird fact that strings are character arrays</a:t>
             </a:r>
           </a:p>
           <a:p>
@@ -4852,10 +4860,10 @@
       </p:sp>
       <p:grpSp>
         <p:nvGrpSpPr>
-          <p:cNvPr id="20" name="Group 19">
-            <a:extLst>
-              <a:ext uri="{FF2B5EF4-FFF2-40B4-BE49-F238E27FC236}">
-                <a16:creationId xmlns:a16="http://schemas.microsoft.com/office/drawing/2014/main" id="{6B558C5C-6B83-7B81-3FF0-957A0ACF8DD5}"/>
+          <p:cNvPr id="21" name="Group 20">
+            <a:extLst>
+              <a:ext uri="{FF2B5EF4-FFF2-40B4-BE49-F238E27FC236}">
+                <a16:creationId xmlns:a16="http://schemas.microsoft.com/office/drawing/2014/main" id="{C87971B2-76C1-838D-C4A4-F7E854C46DC6}"/>
               </a:ext>
             </a:extLst>
           </p:cNvPr>
@@ -4864,31 +4872,30 @@
         </p:nvGrpSpPr>
         <p:grpSpPr>
           <a:xfrm>
-            <a:off x="8171544" y="2823037"/>
-            <a:ext cx="2793999" cy="2597267"/>
-            <a:chOff x="7663544" y="3185894"/>
-            <a:chExt cx="2793999" cy="2597267"/>
+            <a:off x="7148705" y="3429000"/>
+            <a:ext cx="3750826" cy="2491257"/>
+            <a:chOff x="3072005" y="2190493"/>
+            <a:chExt cx="3750826" cy="2491257"/>
           </a:xfrm>
         </p:grpSpPr>
         <p:cxnSp>
           <p:nvCxnSpPr>
-            <p:cNvPr id="10" name="Straight Connector 9">
+            <p:cNvPr id="22" name="Straight Connector 21">
               <a:extLst>
                 <a:ext uri="{FF2B5EF4-FFF2-40B4-BE49-F238E27FC236}">
-                  <a16:creationId xmlns:a16="http://schemas.microsoft.com/office/drawing/2014/main" id="{FB0940B0-DECD-2D0A-F0C5-6890268EFBCE}"/>
+                  <a16:creationId xmlns:a16="http://schemas.microsoft.com/office/drawing/2014/main" id="{B4F78A6E-192F-BA53-4F97-1480A46E2AE8}"/>
                 </a:ext>
               </a:extLst>
             </p:cNvPr>
             <p:cNvCxnSpPr>
               <a:cxnSpLocks/>
-              <a:endCxn id="16" idx="6"/>
             </p:cNvCxnSpPr>
             <p:nvPr/>
           </p:nvCxnSpPr>
           <p:spPr>
             <a:xfrm flipV="1">
-              <a:off x="7663544" y="4942117"/>
-              <a:ext cx="1879602" cy="283025"/>
+              <a:off x="3072005" y="3869968"/>
+              <a:ext cx="1780110" cy="253763"/>
             </a:xfrm>
             <a:prstGeom prst="line">
               <a:avLst/>
@@ -4912,10 +4919,10 @@
         </p:cxnSp>
         <p:cxnSp>
           <p:nvCxnSpPr>
-            <p:cNvPr id="11" name="Straight Connector 10">
+            <p:cNvPr id="23" name="Straight Connector 22">
               <a:extLst>
                 <a:ext uri="{FF2B5EF4-FFF2-40B4-BE49-F238E27FC236}">
-                  <a16:creationId xmlns:a16="http://schemas.microsoft.com/office/drawing/2014/main" id="{574D8D59-94E3-B367-78AB-9EE06D05F514}"/>
+                  <a16:creationId xmlns:a16="http://schemas.microsoft.com/office/drawing/2014/main" id="{E0F0388E-1590-C481-047E-2D6E887B7404}"/>
                 </a:ext>
               </a:extLst>
             </p:cNvPr>
@@ -4926,8 +4933,8 @@
           </p:nvCxnSpPr>
           <p:spPr>
             <a:xfrm flipH="1">
-              <a:off x="9456060" y="3272979"/>
-              <a:ext cx="888995" cy="1669137"/>
+              <a:off x="4834476" y="2604752"/>
+              <a:ext cx="716318" cy="1282747"/>
             </a:xfrm>
             <a:prstGeom prst="line">
               <a:avLst/>
@@ -4955,10 +4962,10 @@
         </p:cxnSp>
         <p:sp>
           <p:nvSpPr>
-            <p:cNvPr id="12" name="TextBox 11">
+            <p:cNvPr id="24" name="TextBox 23">
               <a:extLst>
                 <a:ext uri="{FF2B5EF4-FFF2-40B4-BE49-F238E27FC236}">
-                  <a16:creationId xmlns:a16="http://schemas.microsoft.com/office/drawing/2014/main" id="{EDEE16B5-17E4-6349-3310-594E8F68FCA4}"/>
+                  <a16:creationId xmlns:a16="http://schemas.microsoft.com/office/drawing/2014/main" id="{E8F75431-1A9C-8B94-A579-AA8C238B2ACA}"/>
                 </a:ext>
               </a:extLst>
             </p:cNvPr>
@@ -4967,8 +4974,8 @@
           </p:nvSpPr>
           <p:spPr>
             <a:xfrm>
-              <a:off x="7663544" y="5413829"/>
-              <a:ext cx="2793999" cy="369332"/>
+              <a:off x="3072005" y="4312418"/>
+              <a:ext cx="3750826" cy="369332"/>
             </a:xfrm>
             <a:prstGeom prst="rect">
               <a:avLst/>
@@ -4986,17 +4993,17 @@
                   <a:latin typeface="Courier New" panose="02070309020205020404" pitchFamily="49" charset="0"/>
                   <a:cs typeface="Courier New" panose="02070309020205020404" pitchFamily="49" charset="0"/>
                 </a:rPr>
-                <a:t>1   2   3   4  5  6</a:t>
+                <a:t>1   2   3   4  5  6  7  8 </a:t>
               </a:r>
             </a:p>
           </p:txBody>
         </p:sp>
         <p:sp>
           <p:nvSpPr>
-            <p:cNvPr id="13" name="Oval 12">
+            <p:cNvPr id="25" name="Oval 24">
               <a:extLst>
                 <a:ext uri="{FF2B5EF4-FFF2-40B4-BE49-F238E27FC236}">
-                  <a16:creationId xmlns:a16="http://schemas.microsoft.com/office/drawing/2014/main" id="{9E733C82-2231-6F1A-3759-4EE9975725E1}"/>
+                  <a16:creationId xmlns:a16="http://schemas.microsoft.com/office/drawing/2014/main" id="{E67776D9-4E5D-F862-92ED-09FE3DE909EF}"/>
                 </a:ext>
               </a:extLst>
             </p:cNvPr>
@@ -5005,7 +5012,7 @@
           </p:nvSpPr>
           <p:spPr>
             <a:xfrm>
-              <a:off x="7663544" y="5138056"/>
+              <a:off x="3072005" y="4036645"/>
               <a:ext cx="174171" cy="174171"/>
             </a:xfrm>
             <a:prstGeom prst="ellipse">
@@ -5039,10 +5046,10 @@
         </p:sp>
         <p:sp>
           <p:nvSpPr>
-            <p:cNvPr id="14" name="Oval 13">
+            <p:cNvPr id="26" name="Oval 25">
               <a:extLst>
                 <a:ext uri="{FF2B5EF4-FFF2-40B4-BE49-F238E27FC236}">
-                  <a16:creationId xmlns:a16="http://schemas.microsoft.com/office/drawing/2014/main" id="{70C18EFC-B6A4-F4E5-B567-9EC85DB0CFDB}"/>
+                  <a16:creationId xmlns:a16="http://schemas.microsoft.com/office/drawing/2014/main" id="{F3D8BBA1-489B-11D9-A7CE-6F72CC3DB0E9}"/>
                 </a:ext>
               </a:extLst>
             </p:cNvPr>
@@ -5051,7 +5058,7 @@
           </p:nvSpPr>
           <p:spPr>
             <a:xfrm>
-              <a:off x="8265889" y="5029200"/>
+              <a:off x="3674350" y="3927789"/>
               <a:ext cx="174171" cy="174171"/>
             </a:xfrm>
             <a:prstGeom prst="ellipse">
@@ -5085,10 +5092,10 @@
         </p:sp>
         <p:sp>
           <p:nvSpPr>
-            <p:cNvPr id="15" name="Oval 14">
+            <p:cNvPr id="27" name="Oval 26">
               <a:extLst>
                 <a:ext uri="{FF2B5EF4-FFF2-40B4-BE49-F238E27FC236}">
-                  <a16:creationId xmlns:a16="http://schemas.microsoft.com/office/drawing/2014/main" id="{8CE8A506-D76D-46C8-9EF7-D106E76422D2}"/>
+                  <a16:creationId xmlns:a16="http://schemas.microsoft.com/office/drawing/2014/main" id="{300CEEF0-D4D6-7628-AE96-1B359CF15D3C}"/>
                 </a:ext>
               </a:extLst>
             </p:cNvPr>
@@ -5097,7 +5104,7 @@
           </p:nvSpPr>
           <p:spPr>
             <a:xfrm>
-              <a:off x="8817438" y="4956629"/>
+              <a:off x="4225899" y="3855218"/>
               <a:ext cx="174171" cy="174171"/>
             </a:xfrm>
             <a:prstGeom prst="ellipse">
@@ -5131,10 +5138,10 @@
         </p:sp>
         <p:sp>
           <p:nvSpPr>
-            <p:cNvPr id="16" name="Oval 15">
+            <p:cNvPr id="28" name="Oval 27">
               <a:extLst>
                 <a:ext uri="{FF2B5EF4-FFF2-40B4-BE49-F238E27FC236}">
-                  <a16:creationId xmlns:a16="http://schemas.microsoft.com/office/drawing/2014/main" id="{5EF8369C-28E4-846E-358E-EE0FA92E6473}"/>
+                  <a16:creationId xmlns:a16="http://schemas.microsoft.com/office/drawing/2014/main" id="{C10C2849-A4EE-A185-C7A8-5D9852188B7E}"/>
                 </a:ext>
               </a:extLst>
             </p:cNvPr>
@@ -5143,7 +5150,7 @@
           </p:nvSpPr>
           <p:spPr>
             <a:xfrm>
-              <a:off x="9368975" y="4855031"/>
+              <a:off x="4757326" y="3775508"/>
               <a:ext cx="174171" cy="174171"/>
             </a:xfrm>
             <a:prstGeom prst="ellipse">
@@ -5177,10 +5184,10 @@
         </p:sp>
         <p:sp>
           <p:nvSpPr>
-            <p:cNvPr id="17" name="Oval 16">
+            <p:cNvPr id="29" name="Oval 28">
               <a:extLst>
                 <a:ext uri="{FF2B5EF4-FFF2-40B4-BE49-F238E27FC236}">
-                  <a16:creationId xmlns:a16="http://schemas.microsoft.com/office/drawing/2014/main" id="{8882BE5D-85B4-132A-BCD2-DF8370E06BC4}"/>
+                  <a16:creationId xmlns:a16="http://schemas.microsoft.com/office/drawing/2014/main" id="{334CEC12-6E9E-264F-1577-8860B2878C0F}"/>
                 </a:ext>
               </a:extLst>
             </p:cNvPr>
@@ -5189,7 +5196,7 @@
           </p:nvSpPr>
           <p:spPr>
             <a:xfrm>
-              <a:off x="9840691" y="3976921"/>
+              <a:off x="5115324" y="3134572"/>
               <a:ext cx="174171" cy="174171"/>
             </a:xfrm>
             <a:prstGeom prst="ellipse">
@@ -5198,6 +5205,244 @@
             <a:solidFill>
               <a:srgbClr val="C00000"/>
             </a:solidFill>
+            <a:ln>
+              <a:solidFill>
+                <a:srgbClr val="002060"/>
+              </a:solidFill>
+            </a:ln>
+          </p:spPr>
+          <p:style>
+            <a:lnRef idx="2">
+              <a:schemeClr val="accent1">
+                <a:shade val="50000"/>
+              </a:schemeClr>
+            </a:lnRef>
+            <a:fillRef idx="1">
+              <a:schemeClr val="accent1"/>
+            </a:fillRef>
+            <a:effectRef idx="0">
+              <a:schemeClr val="accent1"/>
+            </a:effectRef>
+            <a:fontRef idx="minor">
+              <a:schemeClr val="lt1"/>
+            </a:fontRef>
+          </p:style>
+          <p:txBody>
+            <a:bodyPr rtlCol="0" anchor="ctr"/>
+            <a:lstStyle/>
+            <a:p>
+              <a:pPr algn="ctr"/>
+              <a:endParaRPr lang="en-US" dirty="0">
+                <a:highlight>
+                  <a:srgbClr val="800000"/>
+                </a:highlight>
+              </a:endParaRPr>
+            </a:p>
+          </p:txBody>
+        </p:sp>
+        <p:cxnSp>
+          <p:nvCxnSpPr>
+            <p:cNvPr id="30" name="Straight Connector 29">
+              <a:extLst>
+                <a:ext uri="{FF2B5EF4-FFF2-40B4-BE49-F238E27FC236}">
+                  <a16:creationId xmlns:a16="http://schemas.microsoft.com/office/drawing/2014/main" id="{7E3D494B-AD62-2DB7-3680-8EEC7D7FA83B}"/>
+                </a:ext>
+              </a:extLst>
+            </p:cNvPr>
+            <p:cNvCxnSpPr>
+              <a:cxnSpLocks/>
+            </p:cNvCxnSpPr>
+            <p:nvPr/>
+          </p:nvCxnSpPr>
+          <p:spPr>
+            <a:xfrm flipV="1">
+              <a:off x="3246176" y="2632075"/>
+              <a:ext cx="2227524" cy="1335739"/>
+            </a:xfrm>
+            <a:prstGeom prst="line">
+              <a:avLst/>
+            </a:prstGeom>
+            <a:ln w="57150">
+              <a:solidFill>
+                <a:srgbClr val="00B050"/>
+              </a:solidFill>
+              <a:prstDash val="sysDash"/>
+            </a:ln>
+          </p:spPr>
+          <p:style>
+            <a:lnRef idx="1">
+              <a:schemeClr val="accent1"/>
+            </a:lnRef>
+            <a:fillRef idx="0">
+              <a:schemeClr val="accent1"/>
+            </a:fillRef>
+            <a:effectRef idx="0">
+              <a:schemeClr val="accent1"/>
+            </a:effectRef>
+            <a:fontRef idx="minor">
+              <a:schemeClr val="tx1"/>
+            </a:fontRef>
+          </p:style>
+        </p:cxnSp>
+        <p:cxnSp>
+          <p:nvCxnSpPr>
+            <p:cNvPr id="31" name="Straight Connector 30">
+              <a:extLst>
+                <a:ext uri="{FF2B5EF4-FFF2-40B4-BE49-F238E27FC236}">
+                  <a16:creationId xmlns:a16="http://schemas.microsoft.com/office/drawing/2014/main" id="{3C0076BA-8637-8AE1-FB9F-FAE8144095A4}"/>
+                </a:ext>
+              </a:extLst>
+            </p:cNvPr>
+            <p:cNvCxnSpPr>
+              <a:cxnSpLocks/>
+            </p:cNvCxnSpPr>
+            <p:nvPr/>
+          </p:nvCxnSpPr>
+          <p:spPr>
+            <a:xfrm flipV="1">
+              <a:off x="5524917" y="2289175"/>
+              <a:ext cx="967997" cy="342900"/>
+            </a:xfrm>
+            <a:prstGeom prst="line">
+              <a:avLst/>
+            </a:prstGeom>
+            <a:ln w="57150"/>
+          </p:spPr>
+          <p:style>
+            <a:lnRef idx="1">
+              <a:schemeClr val="accent1"/>
+            </a:lnRef>
+            <a:fillRef idx="0">
+              <a:schemeClr val="accent1"/>
+            </a:fillRef>
+            <a:effectRef idx="0">
+              <a:schemeClr val="accent1"/>
+            </a:effectRef>
+            <a:fontRef idx="minor">
+              <a:schemeClr val="tx1"/>
+            </a:fontRef>
+          </p:style>
+        </p:cxnSp>
+        <p:sp>
+          <p:nvSpPr>
+            <p:cNvPr id="32" name="Oval 31">
+              <a:extLst>
+                <a:ext uri="{FF2B5EF4-FFF2-40B4-BE49-F238E27FC236}">
+                  <a16:creationId xmlns:a16="http://schemas.microsoft.com/office/drawing/2014/main" id="{C30877B9-2393-5EAC-7BBE-DB5324B7AE13}"/>
+                </a:ext>
+              </a:extLst>
+            </p:cNvPr>
+            <p:cNvSpPr/>
+            <p:nvPr/>
+          </p:nvSpPr>
+          <p:spPr>
+            <a:xfrm>
+              <a:off x="5954714" y="2356899"/>
+              <a:ext cx="174171" cy="174171"/>
+            </a:xfrm>
+            <a:prstGeom prst="ellipse">
+              <a:avLst/>
+            </a:prstGeom>
+          </p:spPr>
+          <p:style>
+            <a:lnRef idx="2">
+              <a:schemeClr val="accent1">
+                <a:shade val="50000"/>
+              </a:schemeClr>
+            </a:lnRef>
+            <a:fillRef idx="1">
+              <a:schemeClr val="accent1"/>
+            </a:fillRef>
+            <a:effectRef idx="0">
+              <a:schemeClr val="accent1"/>
+            </a:effectRef>
+            <a:fontRef idx="minor">
+              <a:schemeClr val="lt1"/>
+            </a:fontRef>
+          </p:style>
+          <p:txBody>
+            <a:bodyPr rtlCol="0" anchor="ctr"/>
+            <a:lstStyle/>
+            <a:p>
+              <a:pPr algn="ctr"/>
+              <a:endParaRPr lang="en-US"/>
+            </a:p>
+          </p:txBody>
+        </p:sp>
+        <p:sp>
+          <p:nvSpPr>
+            <p:cNvPr id="33" name="Oval 32">
+              <a:extLst>
+                <a:ext uri="{FF2B5EF4-FFF2-40B4-BE49-F238E27FC236}">
+                  <a16:creationId xmlns:a16="http://schemas.microsoft.com/office/drawing/2014/main" id="{8C2DA937-8254-672C-FC88-1E317D6C32C5}"/>
+                </a:ext>
+              </a:extLst>
+            </p:cNvPr>
+            <p:cNvSpPr/>
+            <p:nvPr/>
+          </p:nvSpPr>
+          <p:spPr>
+            <a:xfrm>
+              <a:off x="6384511" y="2190493"/>
+              <a:ext cx="174171" cy="174171"/>
+            </a:xfrm>
+            <a:prstGeom prst="ellipse">
+              <a:avLst/>
+            </a:prstGeom>
+          </p:spPr>
+          <p:style>
+            <a:lnRef idx="2">
+              <a:schemeClr val="accent1">
+                <a:shade val="50000"/>
+              </a:schemeClr>
+            </a:lnRef>
+            <a:fillRef idx="1">
+              <a:schemeClr val="accent1"/>
+            </a:fillRef>
+            <a:effectRef idx="0">
+              <a:schemeClr val="accent1"/>
+            </a:effectRef>
+            <a:fontRef idx="minor">
+              <a:schemeClr val="lt1"/>
+            </a:fontRef>
+          </p:style>
+          <p:txBody>
+            <a:bodyPr rtlCol="0" anchor="ctr"/>
+            <a:lstStyle/>
+            <a:p>
+              <a:pPr algn="ctr"/>
+              <a:endParaRPr lang="en-US"/>
+            </a:p>
+          </p:txBody>
+        </p:sp>
+        <p:sp>
+          <p:nvSpPr>
+            <p:cNvPr id="34" name="Oval 33">
+              <a:extLst>
+                <a:ext uri="{FF2B5EF4-FFF2-40B4-BE49-F238E27FC236}">
+                  <a16:creationId xmlns:a16="http://schemas.microsoft.com/office/drawing/2014/main" id="{7AFF46F6-6DCB-2586-7D96-3AA69ECC4ECE}"/>
+                </a:ext>
+              </a:extLst>
+            </p:cNvPr>
+            <p:cNvSpPr/>
+            <p:nvPr/>
+          </p:nvSpPr>
+          <p:spPr>
+            <a:xfrm>
+              <a:off x="5447724" y="2544989"/>
+              <a:ext cx="174171" cy="174171"/>
+            </a:xfrm>
+            <a:prstGeom prst="ellipse">
+              <a:avLst/>
+            </a:prstGeom>
+            <a:solidFill>
+              <a:srgbClr val="C00000"/>
+            </a:solidFill>
+            <a:ln>
+              <a:solidFill>
+                <a:srgbClr val="002060"/>
+              </a:solidFill>
+            </a:ln>
           </p:spPr>
           <p:style>
             <a:lnRef idx="2">
@@ -5228,103 +5473,6 @@
             </a:p>
           </p:txBody>
         </p:sp>
-        <p:sp>
-          <p:nvSpPr>
-            <p:cNvPr id="18" name="Oval 17">
-              <a:extLst>
-                <a:ext uri="{FF2B5EF4-FFF2-40B4-BE49-F238E27FC236}">
-                  <a16:creationId xmlns:a16="http://schemas.microsoft.com/office/drawing/2014/main" id="{B0EB1A86-F91D-45DA-0394-7510BAE2F777}"/>
-                </a:ext>
-              </a:extLst>
-            </p:cNvPr>
-            <p:cNvSpPr/>
-            <p:nvPr/>
-          </p:nvSpPr>
-          <p:spPr>
-            <a:xfrm>
-              <a:off x="10268856" y="3185894"/>
-              <a:ext cx="174171" cy="174171"/>
-            </a:xfrm>
-            <a:prstGeom prst="ellipse">
-              <a:avLst/>
-            </a:prstGeom>
-            <a:solidFill>
-              <a:srgbClr val="C00000"/>
-            </a:solidFill>
-          </p:spPr>
-          <p:style>
-            <a:lnRef idx="2">
-              <a:schemeClr val="accent1">
-                <a:shade val="50000"/>
-              </a:schemeClr>
-            </a:lnRef>
-            <a:fillRef idx="1">
-              <a:schemeClr val="accent1"/>
-            </a:fillRef>
-            <a:effectRef idx="0">
-              <a:schemeClr val="accent1"/>
-            </a:effectRef>
-            <a:fontRef idx="minor">
-              <a:schemeClr val="lt1"/>
-            </a:fontRef>
-          </p:style>
-          <p:txBody>
-            <a:bodyPr rtlCol="0" anchor="ctr"/>
-            <a:lstStyle/>
-            <a:p>
-              <a:pPr algn="ctr"/>
-              <a:endParaRPr lang="en-US">
-                <a:highlight>
-                  <a:srgbClr val="800000"/>
-                </a:highlight>
-              </a:endParaRPr>
-            </a:p>
-          </p:txBody>
-        </p:sp>
-        <p:cxnSp>
-          <p:nvCxnSpPr>
-            <p:cNvPr id="19" name="Straight Connector 18">
-              <a:extLst>
-                <a:ext uri="{FF2B5EF4-FFF2-40B4-BE49-F238E27FC236}">
-                  <a16:creationId xmlns:a16="http://schemas.microsoft.com/office/drawing/2014/main" id="{0C69545D-901B-6B5E-3268-BFAFCF5EF8EB}"/>
-                </a:ext>
-              </a:extLst>
-            </p:cNvPr>
-            <p:cNvCxnSpPr>
-              <a:cxnSpLocks/>
-            </p:cNvCxnSpPr>
-            <p:nvPr/>
-          </p:nvCxnSpPr>
-          <p:spPr>
-            <a:xfrm flipV="1">
-              <a:off x="7837715" y="3316532"/>
-              <a:ext cx="2310747" cy="1690897"/>
-            </a:xfrm>
-            <a:prstGeom prst="line">
-              <a:avLst/>
-            </a:prstGeom>
-            <a:ln w="57150">
-              <a:solidFill>
-                <a:srgbClr val="00B050"/>
-              </a:solidFill>
-              <a:prstDash val="sysDash"/>
-            </a:ln>
-          </p:spPr>
-          <p:style>
-            <a:lnRef idx="1">
-              <a:schemeClr val="accent1"/>
-            </a:lnRef>
-            <a:fillRef idx="0">
-              <a:schemeClr val="accent1"/>
-            </a:fillRef>
-            <a:effectRef idx="0">
-              <a:schemeClr val="accent1"/>
-            </a:effectRef>
-            <a:fontRef idx="minor">
-              <a:schemeClr val="tx1"/>
-            </a:fontRef>
-          </p:style>
-        </p:cxnSp>
       </p:grpSp>
     </p:spTree>
     <p:extLst>

</xml_diff>

<commit_message>
Don't compile if require or prohibit trigger.
</commit_message>
<xml_diff>
--- a/lectures/KR-1.pptx
+++ b/lectures/KR-1.pptx
@@ -271,7 +271,7 @@
           <a:p>
             <a:fld id="{C13A938A-C9BA-0346-A74F-83EB1631032C}" type="datetimeFigureOut">
               <a:rPr lang="en-US" smtClean="0"/>
-              <a:t>7/31/22</a:t>
+              <a:t>1/20/23</a:t>
             </a:fld>
             <a:endParaRPr lang="en-US"/>
           </a:p>
@@ -469,7 +469,7 @@
           <a:p>
             <a:fld id="{C13A938A-C9BA-0346-A74F-83EB1631032C}" type="datetimeFigureOut">
               <a:rPr lang="en-US" smtClean="0"/>
-              <a:t>7/31/22</a:t>
+              <a:t>1/20/23</a:t>
             </a:fld>
             <a:endParaRPr lang="en-US"/>
           </a:p>
@@ -677,7 +677,7 @@
           <a:p>
             <a:fld id="{C13A938A-C9BA-0346-A74F-83EB1631032C}" type="datetimeFigureOut">
               <a:rPr lang="en-US" smtClean="0"/>
-              <a:t>7/31/22</a:t>
+              <a:t>1/20/23</a:t>
             </a:fld>
             <a:endParaRPr lang="en-US"/>
           </a:p>
@@ -875,7 +875,7 @@
           <a:p>
             <a:fld id="{C13A938A-C9BA-0346-A74F-83EB1631032C}" type="datetimeFigureOut">
               <a:rPr lang="en-US" smtClean="0"/>
-              <a:t>7/31/22</a:t>
+              <a:t>1/20/23</a:t>
             </a:fld>
             <a:endParaRPr lang="en-US"/>
           </a:p>
@@ -1150,7 +1150,7 @@
           <a:p>
             <a:fld id="{C13A938A-C9BA-0346-A74F-83EB1631032C}" type="datetimeFigureOut">
               <a:rPr lang="en-US" smtClean="0"/>
-              <a:t>7/31/22</a:t>
+              <a:t>1/20/23</a:t>
             </a:fld>
             <a:endParaRPr lang="en-US"/>
           </a:p>
@@ -1415,7 +1415,7 @@
           <a:p>
             <a:fld id="{C13A938A-C9BA-0346-A74F-83EB1631032C}" type="datetimeFigureOut">
               <a:rPr lang="en-US" smtClean="0"/>
-              <a:t>7/31/22</a:t>
+              <a:t>1/20/23</a:t>
             </a:fld>
             <a:endParaRPr lang="en-US"/>
           </a:p>
@@ -1827,7 +1827,7 @@
           <a:p>
             <a:fld id="{C13A938A-C9BA-0346-A74F-83EB1631032C}" type="datetimeFigureOut">
               <a:rPr lang="en-US" smtClean="0"/>
-              <a:t>7/31/22</a:t>
+              <a:t>1/20/23</a:t>
             </a:fld>
             <a:endParaRPr lang="en-US"/>
           </a:p>
@@ -1968,7 +1968,7 @@
           <a:p>
             <a:fld id="{C13A938A-C9BA-0346-A74F-83EB1631032C}" type="datetimeFigureOut">
               <a:rPr lang="en-US" smtClean="0"/>
-              <a:t>7/31/22</a:t>
+              <a:t>1/20/23</a:t>
             </a:fld>
             <a:endParaRPr lang="en-US"/>
           </a:p>
@@ -2081,7 +2081,7 @@
           <a:p>
             <a:fld id="{C13A938A-C9BA-0346-A74F-83EB1631032C}" type="datetimeFigureOut">
               <a:rPr lang="en-US" smtClean="0"/>
-              <a:t>7/31/22</a:t>
+              <a:t>1/20/23</a:t>
             </a:fld>
             <a:endParaRPr lang="en-US"/>
           </a:p>
@@ -2392,7 +2392,7 @@
           <a:p>
             <a:fld id="{C13A938A-C9BA-0346-A74F-83EB1631032C}" type="datetimeFigureOut">
               <a:rPr lang="en-US" smtClean="0"/>
-              <a:t>7/31/22</a:t>
+              <a:t>1/20/23</a:t>
             </a:fld>
             <a:endParaRPr lang="en-US"/>
           </a:p>
@@ -2680,7 +2680,7 @@
           <a:p>
             <a:fld id="{C13A938A-C9BA-0346-A74F-83EB1631032C}" type="datetimeFigureOut">
               <a:rPr lang="en-US" smtClean="0"/>
-              <a:t>7/31/22</a:t>
+              <a:t>1/20/23</a:t>
             </a:fld>
             <a:endParaRPr lang="en-US"/>
           </a:p>
@@ -2921,7 +2921,7 @@
           <a:p>
             <a:fld id="{C13A938A-C9BA-0346-A74F-83EB1631032C}" type="datetimeFigureOut">
               <a:rPr lang="en-US" smtClean="0"/>
-              <a:t>7/31/22</a:t>
+              <a:t>1/20/23</a:t>
             </a:fld>
             <a:endParaRPr lang="en-US"/>
           </a:p>
@@ -4328,7 +4328,7 @@
             <a:spLocks noGrp="1"/>
           </p:cNvSpPr>
           <p:nvPr>
-            <p:ph sz="half" idx="1"/>
+            <p:ph idx="1"/>
           </p:nvPr>
         </p:nvSpPr>
         <p:spPr/>
@@ -4353,31 +4353,6 @@
               <a:t>Actually doing your homework because it is good for you</a:t>
             </a:r>
           </a:p>
-          <a:p>
-            <a:endParaRPr lang="en-US" dirty="0"/>
-          </a:p>
-        </p:txBody>
-      </p:sp>
-      <p:sp>
-        <p:nvSpPr>
-          <p:cNvPr id="5" name="Content Placeholder 4">
-            <a:extLst>
-              <a:ext uri="{FF2B5EF4-FFF2-40B4-BE49-F238E27FC236}">
-                <a16:creationId xmlns:a16="http://schemas.microsoft.com/office/drawing/2014/main" id="{23FD6821-0D52-C591-FBFA-4AB416D5DA58}"/>
-              </a:ext>
-            </a:extLst>
-          </p:cNvPr>
-          <p:cNvSpPr>
-            <a:spLocks noGrp="1"/>
-          </p:cNvSpPr>
-          <p:nvPr>
-            <p:ph sz="half" idx="2"/>
-          </p:nvPr>
-        </p:nvSpPr>
-        <p:spPr/>
-        <p:txBody>
-          <a:bodyPr/>
-          <a:lstStyle/>
           <a:p>
             <a:endParaRPr lang="en-US" dirty="0"/>
           </a:p>
@@ -5588,7 +5563,7 @@
             <a:pPr lvl="1"/>
             <a:r>
               <a:rPr lang="en-US" dirty="0"/>
-              <a:t>Call by reference is simple – call by reference is in Chapter 5 </a:t>
+              <a:t>Call by value is simple – call by reference is in Chapter 5 </a:t>
             </a:r>
             <a:r>
               <a:rPr lang="en-US" dirty="0">
@@ -5608,7 +5583,15 @@
             <a:pPr lvl="1"/>
             <a:r>
               <a:rPr lang="en-US" dirty="0"/>
-              <a:t>This is important because there is no string object in C</a:t>
+              <a:t>This is important because there </a:t>
+            </a:r>
+            <a:r>
+              <a:rPr lang="en-US" b="1" i="1" u="sng" dirty="0"/>
+              <a:t>is no string object </a:t>
+            </a:r>
+            <a:r>
+              <a:rPr lang="en-US" dirty="0"/>
+              <a:t>in C</a:t>
             </a:r>
           </a:p>
           <a:p>

</xml_diff>